<commit_message>
com as revisoes da Su
</commit_message>
<xml_diff>
--- a/apresentacao ciencia dados.pptx
+++ b/apresentacao ciencia dados.pptx
@@ -5,7 +5,7 @@
     <p:sldMasterId id="2147483648" r:id="rId1"/>
   </p:sldMasterIdLst>
   <p:notesMasterIdLst>
-    <p:notesMasterId r:id="rId14"/>
+    <p:notesMasterId r:id="rId16"/>
   </p:notesMasterIdLst>
   <p:sldIdLst>
     <p:sldId id="256" r:id="rId2"/>
@@ -19,7 +19,9 @@
     <p:sldId id="272" r:id="rId10"/>
     <p:sldId id="282" r:id="rId11"/>
     <p:sldId id="283" r:id="rId12"/>
-    <p:sldId id="281" r:id="rId13"/>
+    <p:sldId id="284" r:id="rId13"/>
+    <p:sldId id="281" r:id="rId14"/>
+    <p:sldId id="285" r:id="rId15"/>
   </p:sldIdLst>
   <p:sldSz cx="9144000" cy="6858000" type="screen4x3"/>
   <p:notesSz cx="6858000" cy="9144000"/>
@@ -220,7 +222,7 @@
             <a:fld id="{D3A8EBA5-A3D1-458F-B493-A7784F843002}" type="datetimeFigureOut">
               <a:rPr lang="en-US" smtClean="0"/>
               <a:pPr/>
-              <a:t>11/29/2016</a:t>
+              <a:t>11/30/2016</a:t>
             </a:fld>
             <a:endParaRPr lang="en-US"/>
           </a:p>
@@ -670,7 +672,7 @@
             <a:fld id="{50201450-F2A9-41C1-8119-B38BC03DA58C}" type="datetime1">
               <a:rPr lang="en-US" smtClean="0"/>
               <a:pPr/>
-              <a:t>11/29/2016</a:t>
+              <a:t>11/30/2016</a:t>
             </a:fld>
             <a:endParaRPr lang="en-US"/>
           </a:p>
@@ -835,7 +837,7 @@
             <a:fld id="{2FEA0145-8AC0-4DDC-911D-F77BEBC790BD}" type="datetime1">
               <a:rPr lang="en-US" smtClean="0"/>
               <a:pPr/>
-              <a:t>11/29/2016</a:t>
+              <a:t>11/30/2016</a:t>
             </a:fld>
             <a:endParaRPr lang="en-US"/>
           </a:p>
@@ -1010,7 +1012,7 @@
             <a:fld id="{511E4AA7-0685-45A7-9F44-7D10107E141B}" type="datetime1">
               <a:rPr lang="en-US" smtClean="0"/>
               <a:pPr/>
-              <a:t>11/29/2016</a:t>
+              <a:t>11/30/2016</a:t>
             </a:fld>
             <a:endParaRPr lang="en-US"/>
           </a:p>
@@ -1175,7 +1177,7 @@
             <a:fld id="{02FFE042-8C99-4012-BBC4-835B518843A0}" type="datetime1">
               <a:rPr lang="en-US" smtClean="0"/>
               <a:pPr/>
-              <a:t>11/29/2016</a:t>
+              <a:t>11/30/2016</a:t>
             </a:fld>
             <a:endParaRPr lang="en-US"/>
           </a:p>
@@ -1417,7 +1419,7 @@
             <a:fld id="{0D4C97B6-059F-43FD-B53A-998549F69658}" type="datetime1">
               <a:rPr lang="en-US" smtClean="0"/>
               <a:pPr/>
-              <a:t>11/29/2016</a:t>
+              <a:t>11/30/2016</a:t>
             </a:fld>
             <a:endParaRPr lang="en-US"/>
           </a:p>
@@ -1699,7 +1701,7 @@
             <a:fld id="{EB07978A-2AF6-4872-9549-BBC7E5EEFE7B}" type="datetime1">
               <a:rPr lang="en-US" smtClean="0"/>
               <a:pPr/>
-              <a:t>11/29/2016</a:t>
+              <a:t>11/30/2016</a:t>
             </a:fld>
             <a:endParaRPr lang="en-US"/>
           </a:p>
@@ -2115,7 +2117,7 @@
             <a:fld id="{A90C1374-2E5A-42C7-B8F6-0AB8B24FEC0B}" type="datetime1">
               <a:rPr lang="en-US" smtClean="0"/>
               <a:pPr/>
-              <a:t>11/29/2016</a:t>
+              <a:t>11/30/2016</a:t>
             </a:fld>
             <a:endParaRPr lang="en-US"/>
           </a:p>
@@ -2229,7 +2231,7 @@
             <a:fld id="{046B26FA-4A17-4144-A70F-4074511E2C99}" type="datetime1">
               <a:rPr lang="en-US" smtClean="0"/>
               <a:pPr/>
-              <a:t>11/29/2016</a:t>
+              <a:t>11/30/2016</a:t>
             </a:fld>
             <a:endParaRPr lang="en-US"/>
           </a:p>
@@ -2321,7 +2323,7 @@
             <a:fld id="{430BF8BC-40DC-4171-ABBA-F975DA434BC3}" type="datetime1">
               <a:rPr lang="en-US" smtClean="0"/>
               <a:pPr/>
-              <a:t>11/29/2016</a:t>
+              <a:t>11/30/2016</a:t>
             </a:fld>
             <a:endParaRPr lang="en-US"/>
           </a:p>
@@ -2593,7 +2595,7 @@
             <a:fld id="{36B2C415-8473-40AA-9C9E-EA02E2BBE695}" type="datetime1">
               <a:rPr lang="en-US" smtClean="0"/>
               <a:pPr/>
-              <a:t>11/29/2016</a:t>
+              <a:t>11/30/2016</a:t>
             </a:fld>
             <a:endParaRPr lang="en-US"/>
           </a:p>
@@ -2842,7 +2844,7 @@
             <a:fld id="{55215ABF-363E-43D1-B7C6-BD8F5D7891DF}" type="datetime1">
               <a:rPr lang="en-US" smtClean="0"/>
               <a:pPr/>
-              <a:t>11/29/2016</a:t>
+              <a:t>11/30/2016</a:t>
             </a:fld>
             <a:endParaRPr lang="en-US"/>
           </a:p>
@@ -3050,7 +3052,7 @@
             <a:fld id="{A4D20CB3-E548-497B-8DA5-345095E99FDB}" type="datetime1">
               <a:rPr lang="en-US" smtClean="0"/>
               <a:pPr/>
-              <a:t>11/29/2016</a:t>
+              <a:t>11/30/2016</a:t>
             </a:fld>
             <a:endParaRPr lang="en-US"/>
           </a:p>
@@ -3528,21 +3530,8 @@
                   <a:schemeClr val="tx1"/>
                 </a:solidFill>
               </a:rPr>
-              <a:t> </a:t>
-            </a:r>
-            <a:r>
-              <a:rPr lang="pt-BR" b="1" dirty="0" err="1">
-                <a:solidFill>
-                  <a:schemeClr val="tx1"/>
-                </a:solidFill>
-              </a:rPr>
-              <a:t>Yinhe</a:t>
-            </a:r>
-            <a:endParaRPr lang="pt-BR" b="1" dirty="0">
-              <a:solidFill>
-                <a:schemeClr val="tx1"/>
-              </a:solidFill>
-            </a:endParaRPr>
+              <a:t> Yin He</a:t>
+            </a:r>
           </a:p>
           <a:p>
             <a:pPr>
@@ -3892,7 +3881,7 @@
           <p:nvPr>
             <p:extLst>
               <p:ext uri="{D42A27DB-BD31-4B8C-83A1-F6EECF244321}">
-                <p14:modId xmlns:p14="http://schemas.microsoft.com/office/powerpoint/2010/main" val="3362144228"/>
+                <p14:modId xmlns:p14="http://schemas.microsoft.com/office/powerpoint/2010/main" val="3495775407"/>
               </p:ext>
             </p:extLst>
           </p:nvPr>
@@ -3988,7 +3977,7 @@
                       <a:pPr algn="ctr"/>
                       <a:r>
                         <a:rPr lang="pt-BR" dirty="0"/>
-                        <a:t>Fatalidades/aeronaves</a:t>
+                        <a:t>Fatalidades/aeronave</a:t>
                       </a:r>
                     </a:p>
                   </a:txBody>
@@ -4193,6 +4182,52 @@
           </a:graphicData>
         </a:graphic>
       </p:graphicFrame>
+      <p:sp>
+        <p:nvSpPr>
+          <p:cNvPr id="6" name="Elipse 5"/>
+          <p:cNvSpPr/>
+          <p:nvPr/>
+        </p:nvSpPr>
+        <p:spPr>
+          <a:xfrm>
+            <a:off x="3505200" y="4800600"/>
+            <a:ext cx="609600" cy="533400"/>
+          </a:xfrm>
+          <a:prstGeom prst="ellipse">
+            <a:avLst/>
+          </a:prstGeom>
+          <a:noFill/>
+          <a:ln>
+            <a:solidFill>
+              <a:srgbClr val="FF0000"/>
+            </a:solidFill>
+          </a:ln>
+        </p:spPr>
+        <p:style>
+          <a:lnRef idx="2">
+            <a:schemeClr val="accent1">
+              <a:shade val="50000"/>
+            </a:schemeClr>
+          </a:lnRef>
+          <a:fillRef idx="1">
+            <a:schemeClr val="accent1"/>
+          </a:fillRef>
+          <a:effectRef idx="0">
+            <a:schemeClr val="accent1"/>
+          </a:effectRef>
+          <a:fontRef idx="minor">
+            <a:schemeClr val="lt1"/>
+          </a:fontRef>
+        </p:style>
+        <p:txBody>
+          <a:bodyPr rtlCol="0" anchor="ctr"/>
+          <a:lstStyle/>
+          <a:p>
+            <a:pPr algn="ctr"/>
+            <a:endParaRPr lang="pt-BR"/>
+          </a:p>
+        </p:txBody>
+      </p:sp>
     </p:spTree>
     <p:extLst>
       <p:ext uri="{BB962C8B-B14F-4D97-AF65-F5344CB8AC3E}">
@@ -4350,14 +4385,14 @@
           <p:nvPr>
             <p:extLst>
               <p:ext uri="{D42A27DB-BD31-4B8C-83A1-F6EECF244321}">
-                <p14:modId xmlns:p14="http://schemas.microsoft.com/office/powerpoint/2010/main" val="3244278762"/>
+                <p14:modId xmlns:p14="http://schemas.microsoft.com/office/powerpoint/2010/main" val="1067363718"/>
               </p:ext>
             </p:extLst>
           </p:nvPr>
         </p:nvGraphicFramePr>
         <p:xfrm>
-          <a:off x="1657350" y="2819400"/>
-          <a:ext cx="5829300" cy="3600520"/>
+          <a:off x="2628900" y="2817778"/>
+          <a:ext cx="3886200" cy="3600520"/>
         </p:xfrm>
         <a:graphic>
           <a:graphicData uri="http://schemas.openxmlformats.org/drawingml/2006/table">
@@ -4370,13 +4405,6 @@
                   <a:extLst>
                     <a:ext uri="{9D8B030D-6E8A-4147-A177-3AD203B41FA5}">
                       <a16:colId xmlns:a16="http://schemas.microsoft.com/office/drawing/2014/main" val="3009972550"/>
-                    </a:ext>
-                  </a:extLst>
-                </a:gridCol>
-                <a:gridCol w="1943100">
-                  <a:extLst>
-                    <a:ext uri="{9D8B030D-6E8A-4147-A177-3AD203B41FA5}">
-                      <a16:colId xmlns:a16="http://schemas.microsoft.com/office/drawing/2014/main" val="613980470"/>
                     </a:ext>
                   </a:extLst>
                 </a:gridCol>
@@ -4399,25 +4427,6 @@
                         <a:rPr lang="pt-BR" dirty="0"/>
                         <a:t>Fator contribuinte</a:t>
                       </a:r>
-                    </a:p>
-                  </a:txBody>
-                  <a:tcPr/>
-                </a:tc>
-                <a:tc>
-                  <a:txBody>
-                    <a:bodyPr/>
-                    <a:lstStyle/>
-                    <a:p>
-                      <a:pPr algn="ctr"/>
-                      <a:r>
-                        <a:rPr lang="pt-BR" dirty="0"/>
-                        <a:t>Fatores das </a:t>
-                      </a:r>
-                      <a:r>
-                        <a:rPr lang="pt-BR" dirty="0" err="1"/>
-                        <a:t>ocorrencias</a:t>
-                      </a:r>
-                      <a:endParaRPr lang="pt-BR" dirty="0"/>
                     </a:p>
                   </a:txBody>
                   <a:tcPr/>
@@ -4469,20 +4478,6 @@
                       <a:pPr algn="ctr"/>
                       <a:r>
                         <a:rPr lang="pt-BR" dirty="0"/>
-                        <a:t>1850</a:t>
-                      </a:r>
-                    </a:p>
-                  </a:txBody>
-                  <a:tcPr/>
-                </a:tc>
-                <a:tc>
-                  <a:txBody>
-                    <a:bodyPr/>
-                    <a:lstStyle/>
-                    <a:p>
-                      <a:pPr algn="ctr"/>
-                      <a:r>
-                        <a:rPr lang="pt-BR" dirty="0"/>
                         <a:t>789</a:t>
                       </a:r>
                     </a:p>
@@ -4505,20 +4500,6 @@
                       <a:r>
                         <a:rPr lang="pt-BR" dirty="0"/>
                         <a:t>Organização</a:t>
-                      </a:r>
-                    </a:p>
-                  </a:txBody>
-                  <a:tcPr/>
-                </a:tc>
-                <a:tc>
-                  <a:txBody>
-                    <a:bodyPr/>
-                    <a:lstStyle/>
-                    <a:p>
-                      <a:pPr algn="ctr"/>
-                      <a:r>
-                        <a:rPr lang="pt-BR" dirty="0"/>
-                        <a:t>1374</a:t>
                       </a:r>
                     </a:p>
                   </a:txBody>
@@ -4567,20 +4548,6 @@
                       <a:pPr algn="ctr"/>
                       <a:r>
                         <a:rPr lang="pt-BR" dirty="0"/>
-                        <a:t>234</a:t>
-                      </a:r>
-                    </a:p>
-                  </a:txBody>
-                  <a:tcPr/>
-                </a:tc>
-                <a:tc>
-                  <a:txBody>
-                    <a:bodyPr/>
-                    <a:lstStyle/>
-                    <a:p>
-                      <a:pPr algn="ctr"/>
-                      <a:r>
-                        <a:rPr lang="pt-BR" dirty="0"/>
                         <a:t>192</a:t>
                       </a:r>
                     </a:p>
@@ -4603,20 +4570,6 @@
                       <a:r>
                         <a:rPr lang="pt-BR" dirty="0"/>
                         <a:t>Normas</a:t>
-                      </a:r>
-                    </a:p>
-                  </a:txBody>
-                  <a:tcPr/>
-                </a:tc>
-                <a:tc>
-                  <a:txBody>
-                    <a:bodyPr/>
-                    <a:lstStyle/>
-                    <a:p>
-                      <a:pPr algn="ctr"/>
-                      <a:r>
-                        <a:rPr lang="pt-BR" dirty="0"/>
-                        <a:t>206</a:t>
                       </a:r>
                     </a:p>
                   </a:txBody>
@@ -4671,20 +4624,6 @@
                   </a:txBody>
                   <a:tcPr/>
                 </a:tc>
-                <a:tc>
-                  <a:txBody>
-                    <a:bodyPr/>
-                    <a:lstStyle/>
-                    <a:p>
-                      <a:pPr algn="ctr"/>
-                      <a:r>
-                        <a:rPr lang="pt-BR" dirty="0"/>
-                        <a:t>132</a:t>
-                      </a:r>
-                    </a:p>
-                  </a:txBody>
-                  <a:tcPr/>
-                </a:tc>
                 <a:extLst>
                   <a:ext uri="{0D108BD9-81ED-4DB2-BD59-A6C34878D82A}">
                     <a16:rowId xmlns:a16="http://schemas.microsoft.com/office/drawing/2014/main" val="2308757382"/>
@@ -4695,6 +4634,52 @@
           </a:graphicData>
         </a:graphic>
       </p:graphicFrame>
+      <p:sp>
+        <p:nvSpPr>
+          <p:cNvPr id="6" name="Elipse 5"/>
+          <p:cNvSpPr/>
+          <p:nvPr/>
+        </p:nvSpPr>
+        <p:spPr>
+          <a:xfrm>
+            <a:off x="2819400" y="3505200"/>
+            <a:ext cx="1676400" cy="1676400"/>
+          </a:xfrm>
+          <a:prstGeom prst="ellipse">
+            <a:avLst/>
+          </a:prstGeom>
+          <a:noFill/>
+          <a:ln>
+            <a:solidFill>
+              <a:srgbClr val="FF0000"/>
+            </a:solidFill>
+          </a:ln>
+        </p:spPr>
+        <p:style>
+          <a:lnRef idx="2">
+            <a:schemeClr val="accent1">
+              <a:shade val="50000"/>
+            </a:schemeClr>
+          </a:lnRef>
+          <a:fillRef idx="1">
+            <a:schemeClr val="accent1"/>
+          </a:fillRef>
+          <a:effectRef idx="0">
+            <a:schemeClr val="accent1"/>
+          </a:effectRef>
+          <a:fontRef idx="minor">
+            <a:schemeClr val="lt1"/>
+          </a:fontRef>
+        </p:style>
+        <p:txBody>
+          <a:bodyPr rtlCol="0" anchor="ctr"/>
+          <a:lstStyle/>
+          <a:p>
+            <a:pPr algn="ctr"/>
+            <a:endParaRPr lang="pt-BR"/>
+          </a:p>
+        </p:txBody>
+      </p:sp>
     </p:spTree>
     <p:extLst>
       <p:ext uri="{BB962C8B-B14F-4D97-AF65-F5344CB8AC3E}">
@@ -4727,15 +4712,43 @@
       </p:grpSpPr>
       <p:sp>
         <p:nvSpPr>
-          <p:cNvPr id="2" name="Título 1"/>
-          <p:cNvSpPr>
-            <a:spLocks noGrp="1"/>
-          </p:cNvSpPr>
-          <p:nvPr>
-            <p:ph type="ctrTitle"/>
+          <p:cNvPr id="2" name="Title 1"/>
+          <p:cNvSpPr>
+            <a:spLocks noGrp="1"/>
+          </p:cNvSpPr>
+          <p:nvPr>
+            <p:ph type="title"/>
           </p:nvPr>
         </p:nvSpPr>
         <p:spPr/>
+        <p:txBody>
+          <a:bodyPr/>
+          <a:lstStyle/>
+          <a:p>
+            <a:r>
+              <a:rPr lang="en-US" dirty="0" err="1"/>
+              <a:t>Descobertas</a:t>
+            </a:r>
+            <a:endParaRPr lang="en-US" dirty="0"/>
+          </a:p>
+        </p:txBody>
+      </p:sp>
+      <p:sp>
+        <p:nvSpPr>
+          <p:cNvPr id="3" name="Content Placeholder 2"/>
+          <p:cNvSpPr>
+            <a:spLocks noGrp="1"/>
+          </p:cNvSpPr>
+          <p:nvPr>
+            <p:ph idx="1"/>
+          </p:nvPr>
+        </p:nvSpPr>
+        <p:spPr>
+          <a:xfrm>
+            <a:off x="457200" y="1143000"/>
+            <a:ext cx="8229600" cy="1219199"/>
+          </a:xfrm>
+        </p:spPr>
         <p:txBody>
           <a:bodyPr>
             <a:normAutofit/>
@@ -4743,16 +4756,57 @@
           <a:lstStyle/>
           <a:p>
             <a:r>
-              <a:rPr lang="pt-BR" sz="6000"/>
-              <a:t>Obrigado!</a:t>
-            </a:r>
-            <a:endParaRPr lang="en-US" sz="6000" dirty="0"/>
-          </a:p>
-        </p:txBody>
-      </p:sp>
-      <p:sp>
-        <p:nvSpPr>
-          <p:cNvPr id="6" name="Slide Number Placeholder 5"/>
+              <a:rPr lang="en-US" dirty="0" err="1"/>
+              <a:t>Qual</a:t>
+            </a:r>
+            <a:r>
+              <a:rPr lang="en-US" dirty="0"/>
+              <a:t> o </a:t>
+            </a:r>
+            <a:r>
+              <a:rPr lang="en-US" dirty="0" err="1"/>
+              <a:t>fator</a:t>
+            </a:r>
+            <a:r>
+              <a:rPr lang="en-US" dirty="0"/>
+              <a:t> </a:t>
+            </a:r>
+            <a:r>
+              <a:rPr lang="en-US" dirty="0" err="1"/>
+              <a:t>contribuinte</a:t>
+            </a:r>
+            <a:r>
+              <a:rPr lang="en-US" dirty="0"/>
+              <a:t> para a </a:t>
+            </a:r>
+            <a:r>
+              <a:rPr lang="en-US" dirty="0" err="1"/>
+              <a:t>maioria</a:t>
+            </a:r>
+            <a:r>
+              <a:rPr lang="en-US" dirty="0"/>
+              <a:t> dos </a:t>
+            </a:r>
+            <a:r>
+              <a:rPr lang="en-US" dirty="0" err="1"/>
+              <a:t>incidentes</a:t>
+            </a:r>
+            <a:r>
+              <a:rPr lang="en-US" dirty="0"/>
+              <a:t> (cont.)?</a:t>
+            </a:r>
+          </a:p>
+          <a:p>
+            <a:pPr marL="0" indent="0">
+              <a:buNone/>
+            </a:pPr>
+            <a:endParaRPr lang="en-US" dirty="0"/>
+          </a:p>
+        </p:txBody>
+      </p:sp>
+      <p:sp>
+        <p:nvSpPr>
+          <p:cNvPr id="5" name="Slide Number Placeholder 4"/>
           <p:cNvSpPr>
             <a:spLocks noGrp="1"/>
           </p:cNvSpPr>
@@ -4774,6 +4828,630 @@
           </a:p>
         </p:txBody>
       </p:sp>
+      <p:graphicFrame>
+        <p:nvGraphicFramePr>
+          <p:cNvPr id="14" name="Tabela 13"/>
+          <p:cNvGraphicFramePr>
+            <a:graphicFrameLocks noGrp="1"/>
+          </p:cNvGraphicFramePr>
+          <p:nvPr>
+            <p:extLst>
+              <p:ext uri="{D42A27DB-BD31-4B8C-83A1-F6EECF244321}">
+                <p14:modId xmlns:p14="http://schemas.microsoft.com/office/powerpoint/2010/main" val="2524535686"/>
+              </p:ext>
+            </p:extLst>
+          </p:nvPr>
+        </p:nvGraphicFramePr>
+        <p:xfrm>
+          <a:off x="914398" y="2209800"/>
+          <a:ext cx="7162804" cy="4432568"/>
+        </p:xfrm>
+        <a:graphic>
+          <a:graphicData uri="http://schemas.openxmlformats.org/drawingml/2006/table">
+            <a:tbl>
+              <a:tblPr firstRow="1" bandRow="1">
+                <a:tableStyleId>{5C22544A-7EE6-4342-B048-85BDC9FD1C3A}</a:tableStyleId>
+              </a:tblPr>
+              <a:tblGrid>
+                <a:gridCol w="1790701">
+                  <a:extLst>
+                    <a:ext uri="{9D8B030D-6E8A-4147-A177-3AD203B41FA5}">
+                      <a16:colId xmlns:a16="http://schemas.microsoft.com/office/drawing/2014/main" val="3009972550"/>
+                    </a:ext>
+                  </a:extLst>
+                </a:gridCol>
+                <a:gridCol w="1790701">
+                  <a:extLst>
+                    <a:ext uri="{9D8B030D-6E8A-4147-A177-3AD203B41FA5}">
+                      <a16:colId xmlns:a16="http://schemas.microsoft.com/office/drawing/2014/main" val="613980470"/>
+                    </a:ext>
+                  </a:extLst>
+                </a:gridCol>
+                <a:gridCol w="1790701">
+                  <a:extLst>
+                    <a:ext uri="{9D8B030D-6E8A-4147-A177-3AD203B41FA5}">
+                      <a16:colId xmlns:a16="http://schemas.microsoft.com/office/drawing/2014/main" val="381861498"/>
+                    </a:ext>
+                  </a:extLst>
+                </a:gridCol>
+                <a:gridCol w="1790701">
+                  <a:extLst>
+                    <a:ext uri="{9D8B030D-6E8A-4147-A177-3AD203B41FA5}">
+                      <a16:colId xmlns:a16="http://schemas.microsoft.com/office/drawing/2014/main" val="1991093738"/>
+                    </a:ext>
+                  </a:extLst>
+                </a:gridCol>
+              </a:tblGrid>
+              <a:tr h="570914">
+                <a:tc>
+                  <a:txBody>
+                    <a:bodyPr/>
+                    <a:lstStyle/>
+                    <a:p>
+                      <a:pPr algn="ctr"/>
+                      <a:r>
+                        <a:rPr lang="pt-BR" dirty="0"/>
+                        <a:t>Fator</a:t>
+                      </a:r>
+                    </a:p>
+                  </a:txBody>
+                  <a:tcPr/>
+                </a:tc>
+                <a:tc>
+                  <a:txBody>
+                    <a:bodyPr/>
+                    <a:lstStyle/>
+                    <a:p>
+                      <a:pPr algn="ctr"/>
+                      <a:r>
+                        <a:rPr lang="pt-BR" dirty="0"/>
+                        <a:t>Classificação</a:t>
+                      </a:r>
+                    </a:p>
+                  </a:txBody>
+                  <a:tcPr/>
+                </a:tc>
+                <a:tc>
+                  <a:txBody>
+                    <a:bodyPr/>
+                    <a:lstStyle/>
+                    <a:p>
+                      <a:pPr algn="ctr"/>
+                      <a:r>
+                        <a:rPr lang="pt-BR" dirty="0"/>
+                        <a:t>Quantidade de Fatalidades</a:t>
+                      </a:r>
+                    </a:p>
+                  </a:txBody>
+                  <a:tcPr/>
+                </a:tc>
+                <a:tc>
+                  <a:txBody>
+                    <a:bodyPr/>
+                    <a:lstStyle/>
+                    <a:p>
+                      <a:pPr algn="ctr"/>
+                      <a:r>
+                        <a:rPr lang="pt-BR" dirty="0"/>
+                        <a:t>Aeronaves</a:t>
+                      </a:r>
+                    </a:p>
+                  </a:txBody>
+                  <a:tcPr/>
+                </a:tc>
+                <a:extLst>
+                  <a:ext uri="{0D108BD9-81ED-4DB2-BD59-A6C34878D82A}">
+                    <a16:rowId xmlns:a16="http://schemas.microsoft.com/office/drawing/2014/main" val="20274608"/>
+                  </a:ext>
+                </a:extLst>
+              </a:tr>
+              <a:tr h="592088">
+                <a:tc>
+                  <a:txBody>
+                    <a:bodyPr/>
+                    <a:lstStyle/>
+                    <a:p>
+                      <a:pPr algn="ctr"/>
+                      <a:r>
+                        <a:rPr lang="pt-BR" dirty="0"/>
+                        <a:t>Julgamento de pilotagem</a:t>
+                      </a:r>
+                    </a:p>
+                  </a:txBody>
+                  <a:tcPr/>
+                </a:tc>
+                <a:tc>
+                  <a:txBody>
+                    <a:bodyPr/>
+                    <a:lstStyle/>
+                    <a:p>
+                      <a:pPr algn="ctr"/>
+                      <a:r>
+                        <a:rPr lang="pt-BR" dirty="0"/>
+                        <a:t>Piloto</a:t>
+                      </a:r>
+                    </a:p>
+                  </a:txBody>
+                  <a:tcPr/>
+                </a:tc>
+                <a:tc>
+                  <a:txBody>
+                    <a:bodyPr/>
+                    <a:lstStyle/>
+                    <a:p>
+                      <a:pPr algn="ctr"/>
+                      <a:r>
+                        <a:rPr lang="pt-BR" dirty="0"/>
+                        <a:t>672</a:t>
+                      </a:r>
+                    </a:p>
+                  </a:txBody>
+                  <a:tcPr/>
+                </a:tc>
+                <a:tc>
+                  <a:txBody>
+                    <a:bodyPr/>
+                    <a:lstStyle/>
+                    <a:p>
+                      <a:pPr algn="ctr"/>
+                      <a:r>
+                        <a:rPr lang="pt-BR" dirty="0"/>
+                        <a:t>499</a:t>
+                      </a:r>
+                    </a:p>
+                  </a:txBody>
+                  <a:tcPr/>
+                </a:tc>
+                <a:extLst>
+                  <a:ext uri="{0D108BD9-81ED-4DB2-BD59-A6C34878D82A}">
+                    <a16:rowId xmlns:a16="http://schemas.microsoft.com/office/drawing/2014/main" val="1131738232"/>
+                  </a:ext>
+                </a:extLst>
+              </a:tr>
+              <a:tr h="592088">
+                <a:tc>
+                  <a:txBody>
+                    <a:bodyPr/>
+                    <a:lstStyle/>
+                    <a:p>
+                      <a:pPr algn="ctr"/>
+                      <a:r>
+                        <a:rPr lang="pt-BR" dirty="0"/>
+                        <a:t>Planejamento de voo</a:t>
+                      </a:r>
+                    </a:p>
+                  </a:txBody>
+                  <a:tcPr/>
+                </a:tc>
+                <a:tc>
+                  <a:txBody>
+                    <a:bodyPr/>
+                    <a:lstStyle/>
+                    <a:p>
+                      <a:pPr algn="ctr"/>
+                      <a:r>
+                        <a:rPr lang="pt-BR" dirty="0"/>
+                        <a:t>Organização</a:t>
+                      </a:r>
+                    </a:p>
+                  </a:txBody>
+                  <a:tcPr/>
+                </a:tc>
+                <a:tc>
+                  <a:txBody>
+                    <a:bodyPr/>
+                    <a:lstStyle/>
+                    <a:p>
+                      <a:pPr algn="ctr"/>
+                      <a:r>
+                        <a:rPr lang="pt-BR" dirty="0"/>
+                        <a:t>604</a:t>
+                      </a:r>
+                    </a:p>
+                  </a:txBody>
+                  <a:tcPr/>
+                </a:tc>
+                <a:tc>
+                  <a:txBody>
+                    <a:bodyPr/>
+                    <a:lstStyle/>
+                    <a:p>
+                      <a:pPr algn="ctr"/>
+                      <a:r>
+                        <a:rPr lang="pt-BR" dirty="0"/>
+                        <a:t>337</a:t>
+                      </a:r>
+                    </a:p>
+                  </a:txBody>
+                  <a:tcPr/>
+                </a:tc>
+                <a:extLst>
+                  <a:ext uri="{0D108BD9-81ED-4DB2-BD59-A6C34878D82A}">
+                    <a16:rowId xmlns:a16="http://schemas.microsoft.com/office/drawing/2014/main" val="3901065553"/>
+                  </a:ext>
+                </a:extLst>
+              </a:tr>
+              <a:tr h="592088">
+                <a:tc>
+                  <a:txBody>
+                    <a:bodyPr/>
+                    <a:lstStyle/>
+                    <a:p>
+                      <a:pPr algn="ctr"/>
+                      <a:r>
+                        <a:rPr lang="pt-BR" dirty="0"/>
+                        <a:t>Supervisão gerencial</a:t>
+                      </a:r>
+                    </a:p>
+                  </a:txBody>
+                  <a:tcPr/>
+                </a:tc>
+                <a:tc>
+                  <a:txBody>
+                    <a:bodyPr/>
+                    <a:lstStyle/>
+                    <a:p>
+                      <a:pPr algn="ctr"/>
+                      <a:r>
+                        <a:rPr lang="pt-BR" dirty="0"/>
+                        <a:t>Organização</a:t>
+                      </a:r>
+                    </a:p>
+                  </a:txBody>
+                  <a:tcPr/>
+                </a:tc>
+                <a:tc>
+                  <a:txBody>
+                    <a:bodyPr/>
+                    <a:lstStyle/>
+                    <a:p>
+                      <a:pPr algn="ctr"/>
+                      <a:r>
+                        <a:rPr lang="pt-BR" dirty="0"/>
+                        <a:t>602</a:t>
+                      </a:r>
+                    </a:p>
+                  </a:txBody>
+                  <a:tcPr/>
+                </a:tc>
+                <a:tc>
+                  <a:txBody>
+                    <a:bodyPr/>
+                    <a:lstStyle/>
+                    <a:p>
+                      <a:pPr algn="ctr"/>
+                      <a:r>
+                        <a:rPr lang="pt-BR" dirty="0"/>
+                        <a:t>380</a:t>
+                      </a:r>
+                    </a:p>
+                  </a:txBody>
+                  <a:tcPr/>
+                </a:tc>
+                <a:extLst>
+                  <a:ext uri="{0D108BD9-81ED-4DB2-BD59-A6C34878D82A}">
+                    <a16:rowId xmlns:a16="http://schemas.microsoft.com/office/drawing/2014/main" val="3477588915"/>
+                  </a:ext>
+                </a:extLst>
+              </a:tr>
+              <a:tr h="592088">
+                <a:tc>
+                  <a:txBody>
+                    <a:bodyPr/>
+                    <a:lstStyle/>
+                    <a:p>
+                      <a:pPr algn="ctr"/>
+                      <a:r>
+                        <a:rPr lang="pt-BR" dirty="0"/>
+                        <a:t>Coordenação de cabine</a:t>
+                      </a:r>
+                    </a:p>
+                  </a:txBody>
+                  <a:tcPr/>
+                </a:tc>
+                <a:tc>
+                  <a:txBody>
+                    <a:bodyPr/>
+                    <a:lstStyle/>
+                    <a:p>
+                      <a:pPr algn="ctr"/>
+                      <a:r>
+                        <a:rPr lang="pt-BR" dirty="0"/>
+                        <a:t>Piloto</a:t>
+                      </a:r>
+                    </a:p>
+                  </a:txBody>
+                  <a:tcPr/>
+                </a:tc>
+                <a:tc>
+                  <a:txBody>
+                    <a:bodyPr/>
+                    <a:lstStyle/>
+                    <a:p>
+                      <a:pPr algn="ctr"/>
+                      <a:r>
+                        <a:rPr lang="pt-BR" dirty="0"/>
+                        <a:t>481</a:t>
+                      </a:r>
+                    </a:p>
+                  </a:txBody>
+                  <a:tcPr/>
+                </a:tc>
+                <a:tc>
+                  <a:txBody>
+                    <a:bodyPr/>
+                    <a:lstStyle/>
+                    <a:p>
+                      <a:pPr algn="ctr"/>
+                      <a:r>
+                        <a:rPr lang="pt-BR" dirty="0"/>
+                        <a:t>92</a:t>
+                      </a:r>
+                    </a:p>
+                  </a:txBody>
+                  <a:tcPr/>
+                </a:tc>
+                <a:extLst>
+                  <a:ext uri="{0D108BD9-81ED-4DB2-BD59-A6C34878D82A}">
+                    <a16:rowId xmlns:a16="http://schemas.microsoft.com/office/drawing/2014/main" val="2959120716"/>
+                  </a:ext>
+                </a:extLst>
+              </a:tr>
+              <a:tr h="592088">
+                <a:tc>
+                  <a:txBody>
+                    <a:bodyPr/>
+                    <a:lstStyle/>
+                    <a:p>
+                      <a:pPr algn="ctr"/>
+                      <a:r>
+                        <a:rPr lang="pt-BR" dirty="0"/>
+                        <a:t>Instrução </a:t>
+                      </a:r>
+                    </a:p>
+                  </a:txBody>
+                  <a:tcPr/>
+                </a:tc>
+                <a:tc>
+                  <a:txBody>
+                    <a:bodyPr/>
+                    <a:lstStyle/>
+                    <a:p>
+                      <a:pPr algn="ctr"/>
+                      <a:r>
+                        <a:rPr lang="pt-BR" dirty="0"/>
+                        <a:t>Treinamento</a:t>
+                      </a:r>
+                    </a:p>
+                  </a:txBody>
+                  <a:tcPr/>
+                </a:tc>
+                <a:tc>
+                  <a:txBody>
+                    <a:bodyPr/>
+                    <a:lstStyle/>
+                    <a:p>
+                      <a:pPr algn="ctr"/>
+                      <a:r>
+                        <a:rPr lang="pt-BR" dirty="0"/>
+                        <a:t>467</a:t>
+                      </a:r>
+                    </a:p>
+                  </a:txBody>
+                  <a:tcPr/>
+                </a:tc>
+                <a:tc>
+                  <a:txBody>
+                    <a:bodyPr/>
+                    <a:lstStyle/>
+                    <a:p>
+                      <a:pPr algn="ctr"/>
+                      <a:r>
+                        <a:rPr lang="pt-BR" dirty="0"/>
+                        <a:t>148</a:t>
+                      </a:r>
+                    </a:p>
+                  </a:txBody>
+                  <a:tcPr/>
+                </a:tc>
+                <a:extLst>
+                  <a:ext uri="{0D108BD9-81ED-4DB2-BD59-A6C34878D82A}">
+                    <a16:rowId xmlns:a16="http://schemas.microsoft.com/office/drawing/2014/main" val="2308757382"/>
+                  </a:ext>
+                </a:extLst>
+              </a:tr>
+              <a:tr h="592088">
+                <a:tc>
+                  <a:txBody>
+                    <a:bodyPr/>
+                    <a:lstStyle/>
+                    <a:p>
+                      <a:pPr algn="ctr"/>
+                      <a:r>
+                        <a:rPr lang="pt-BR" dirty="0"/>
+                        <a:t>Indisciplina de Voo</a:t>
+                      </a:r>
+                    </a:p>
+                  </a:txBody>
+                  <a:tcPr/>
+                </a:tc>
+                <a:tc>
+                  <a:txBody>
+                    <a:bodyPr/>
+                    <a:lstStyle/>
+                    <a:p>
+                      <a:pPr algn="ctr"/>
+                      <a:r>
+                        <a:rPr lang="pt-BR" dirty="0"/>
+                        <a:t>Normas</a:t>
+                      </a:r>
+                    </a:p>
+                  </a:txBody>
+                  <a:tcPr/>
+                </a:tc>
+                <a:tc>
+                  <a:txBody>
+                    <a:bodyPr/>
+                    <a:lstStyle/>
+                    <a:p>
+                      <a:pPr algn="ctr"/>
+                      <a:r>
+                        <a:rPr lang="pt-BR" dirty="0"/>
+                        <a:t>409</a:t>
+                      </a:r>
+                    </a:p>
+                  </a:txBody>
+                  <a:tcPr/>
+                </a:tc>
+                <a:tc>
+                  <a:txBody>
+                    <a:bodyPr/>
+                    <a:lstStyle/>
+                    <a:p>
+                      <a:pPr algn="ctr"/>
+                      <a:r>
+                        <a:rPr lang="pt-BR" dirty="0"/>
+                        <a:t>167</a:t>
+                      </a:r>
+                    </a:p>
+                  </a:txBody>
+                  <a:tcPr/>
+                </a:tc>
+                <a:extLst>
+                  <a:ext uri="{0D108BD9-81ED-4DB2-BD59-A6C34878D82A}">
+                    <a16:rowId xmlns:a16="http://schemas.microsoft.com/office/drawing/2014/main" val="2362869105"/>
+                  </a:ext>
+                </a:extLst>
+              </a:tr>
+            </a:tbl>
+          </a:graphicData>
+        </a:graphic>
+      </p:graphicFrame>
+      <p:sp>
+        <p:nvSpPr>
+          <p:cNvPr id="7" name="Elipse 6"/>
+          <p:cNvSpPr/>
+          <p:nvPr/>
+        </p:nvSpPr>
+        <p:spPr>
+          <a:xfrm>
+            <a:off x="838200" y="5943599"/>
+            <a:ext cx="7239002" cy="698769"/>
+          </a:xfrm>
+          <a:prstGeom prst="ellipse">
+            <a:avLst/>
+          </a:prstGeom>
+          <a:noFill/>
+          <a:ln>
+            <a:solidFill>
+              <a:srgbClr val="FF0000"/>
+            </a:solidFill>
+          </a:ln>
+        </p:spPr>
+        <p:style>
+          <a:lnRef idx="2">
+            <a:schemeClr val="accent1">
+              <a:shade val="50000"/>
+            </a:schemeClr>
+          </a:lnRef>
+          <a:fillRef idx="1">
+            <a:schemeClr val="accent1"/>
+          </a:fillRef>
+          <a:effectRef idx="0">
+            <a:schemeClr val="accent1"/>
+          </a:effectRef>
+          <a:fontRef idx="minor">
+            <a:schemeClr val="lt1"/>
+          </a:fontRef>
+        </p:style>
+        <p:txBody>
+          <a:bodyPr rtlCol="0" anchor="ctr"/>
+          <a:lstStyle/>
+          <a:p>
+            <a:pPr algn="ctr"/>
+            <a:endParaRPr lang="pt-BR"/>
+          </a:p>
+        </p:txBody>
+      </p:sp>
+    </p:spTree>
+    <p:extLst>
+      <p:ext uri="{BB962C8B-B14F-4D97-AF65-F5344CB8AC3E}">
+        <p14:creationId xmlns:p14="http://schemas.microsoft.com/office/powerpoint/2010/main" val="1849305516"/>
+      </p:ext>
+    </p:extLst>
+  </p:cSld>
+  <p:clrMapOvr>
+    <a:masterClrMapping/>
+  </p:clrMapOvr>
+</p:sld>
+</file>
+
+<file path=ppt/slides/slide13.xml><?xml version="1.0" encoding="utf-8"?>
+<p:sld xmlns:a="http://schemas.openxmlformats.org/drawingml/2006/main" xmlns:r="http://schemas.openxmlformats.org/officeDocument/2006/relationships" xmlns:p="http://schemas.openxmlformats.org/presentationml/2006/main">
+  <p:cSld>
+    <p:spTree>
+      <p:nvGrpSpPr>
+        <p:cNvPr id="1" name=""/>
+        <p:cNvGrpSpPr/>
+        <p:nvPr/>
+      </p:nvGrpSpPr>
+      <p:grpSpPr>
+        <a:xfrm>
+          <a:off x="0" y="0"/>
+          <a:ext cx="0" cy="0"/>
+          <a:chOff x="0" y="0"/>
+          <a:chExt cx="0" cy="0"/>
+        </a:xfrm>
+      </p:grpSpPr>
+      <p:sp>
+        <p:nvSpPr>
+          <p:cNvPr id="2" name="Título 1"/>
+          <p:cNvSpPr>
+            <a:spLocks noGrp="1"/>
+          </p:cNvSpPr>
+          <p:nvPr>
+            <p:ph type="ctrTitle"/>
+          </p:nvPr>
+        </p:nvSpPr>
+        <p:spPr/>
+        <p:txBody>
+          <a:bodyPr>
+            <a:normAutofit/>
+          </a:bodyPr>
+          <a:lstStyle/>
+          <a:p>
+            <a:r>
+              <a:rPr lang="pt-BR" sz="6000" dirty="0"/>
+              <a:t>Perguntas?</a:t>
+            </a:r>
+            <a:endParaRPr lang="en-US" sz="6000" dirty="0"/>
+          </a:p>
+        </p:txBody>
+      </p:sp>
+      <p:sp>
+        <p:nvSpPr>
+          <p:cNvPr id="6" name="Slide Number Placeholder 5"/>
+          <p:cNvSpPr>
+            <a:spLocks noGrp="1"/>
+          </p:cNvSpPr>
+          <p:nvPr>
+            <p:ph type="sldNum" sz="quarter" idx="12"/>
+          </p:nvPr>
+        </p:nvSpPr>
+        <p:spPr/>
+        <p:txBody>
+          <a:bodyPr/>
+          <a:lstStyle/>
+          <a:p>
+            <a:fld id="{8FE1B02D-2A3F-49DE-AB67-7B93722EBA11}" type="slidenum">
+              <a:rPr lang="en-US" smtClean="0"/>
+              <a:pPr/>
+              <a:t>13</a:t>
+            </a:fld>
+            <a:endParaRPr lang="en-US"/>
+          </a:p>
+        </p:txBody>
+      </p:sp>
       <p:sp>
         <p:nvSpPr>
           <p:cNvPr id="4" name="Subtítulo 3"/>
@@ -4797,6 +5475,104 @@
     <p:extLst>
       <p:ext uri="{BB962C8B-B14F-4D97-AF65-F5344CB8AC3E}">
         <p14:creationId xmlns:p14="http://schemas.microsoft.com/office/powerpoint/2010/main" val="78595364"/>
+      </p:ext>
+    </p:extLst>
+  </p:cSld>
+  <p:clrMapOvr>
+    <a:masterClrMapping/>
+  </p:clrMapOvr>
+</p:sld>
+</file>
+
+<file path=ppt/slides/slide14.xml><?xml version="1.0" encoding="utf-8"?>
+<p:sld xmlns:a="http://schemas.openxmlformats.org/drawingml/2006/main" xmlns:r="http://schemas.openxmlformats.org/officeDocument/2006/relationships" xmlns:p="http://schemas.openxmlformats.org/presentationml/2006/main">
+  <p:cSld>
+    <p:spTree>
+      <p:nvGrpSpPr>
+        <p:cNvPr id="1" name=""/>
+        <p:cNvGrpSpPr/>
+        <p:nvPr/>
+      </p:nvGrpSpPr>
+      <p:grpSpPr>
+        <a:xfrm>
+          <a:off x="0" y="0"/>
+          <a:ext cx="0" cy="0"/>
+          <a:chOff x="0" y="0"/>
+          <a:chExt cx="0" cy="0"/>
+        </a:xfrm>
+      </p:grpSpPr>
+      <p:sp>
+        <p:nvSpPr>
+          <p:cNvPr id="2" name="Título 1"/>
+          <p:cNvSpPr>
+            <a:spLocks noGrp="1"/>
+          </p:cNvSpPr>
+          <p:nvPr>
+            <p:ph type="ctrTitle"/>
+          </p:nvPr>
+        </p:nvSpPr>
+        <p:spPr/>
+        <p:txBody>
+          <a:bodyPr>
+            <a:normAutofit/>
+          </a:bodyPr>
+          <a:lstStyle/>
+          <a:p>
+            <a:r>
+              <a:rPr lang="pt-BR" sz="6000"/>
+              <a:t>Obrigado!</a:t>
+            </a:r>
+            <a:endParaRPr lang="en-US" sz="6000" dirty="0"/>
+          </a:p>
+        </p:txBody>
+      </p:sp>
+      <p:sp>
+        <p:nvSpPr>
+          <p:cNvPr id="6" name="Slide Number Placeholder 5"/>
+          <p:cNvSpPr>
+            <a:spLocks noGrp="1"/>
+          </p:cNvSpPr>
+          <p:nvPr>
+            <p:ph type="sldNum" sz="quarter" idx="12"/>
+          </p:nvPr>
+        </p:nvSpPr>
+        <p:spPr/>
+        <p:txBody>
+          <a:bodyPr/>
+          <a:lstStyle/>
+          <a:p>
+            <a:fld id="{8FE1B02D-2A3F-49DE-AB67-7B93722EBA11}" type="slidenum">
+              <a:rPr lang="en-US" smtClean="0"/>
+              <a:pPr/>
+              <a:t>14</a:t>
+            </a:fld>
+            <a:endParaRPr lang="en-US"/>
+          </a:p>
+        </p:txBody>
+      </p:sp>
+      <p:sp>
+        <p:nvSpPr>
+          <p:cNvPr id="4" name="Subtítulo 3"/>
+          <p:cNvSpPr>
+            <a:spLocks noGrp="1"/>
+          </p:cNvSpPr>
+          <p:nvPr>
+            <p:ph type="subTitle" idx="1"/>
+          </p:nvPr>
+        </p:nvSpPr>
+        <p:spPr/>
+        <p:txBody>
+          <a:bodyPr/>
+          <a:lstStyle/>
+          <a:p>
+            <a:endParaRPr lang="pt-BR"/>
+          </a:p>
+        </p:txBody>
+      </p:sp>
+    </p:spTree>
+    <p:extLst>
+      <p:ext uri="{BB962C8B-B14F-4D97-AF65-F5344CB8AC3E}">
+        <p14:creationId xmlns:p14="http://schemas.microsoft.com/office/powerpoint/2010/main" val="1528458059"/>
       </p:ext>
     </p:extLst>
   </p:cSld>
@@ -5100,6 +5876,47 @@
           </a:p>
         </p:txBody>
       </p:sp>
+      <p:pic>
+        <p:nvPicPr>
+          <p:cNvPr id="1026" name="Picture 2" descr="Resultado de imagem para CENIPA"/>
+          <p:cNvPicPr>
+            <a:picLocks noChangeAspect="1" noChangeArrowheads="1"/>
+          </p:cNvPicPr>
+          <p:nvPr/>
+        </p:nvPicPr>
+        <p:blipFill>
+          <a:blip r:embed="rId2" cstate="print">
+            <a:extLst>
+              <a:ext uri="{28A0092B-C50C-407E-A947-70E740481C1C}">
+                <a14:useLocalDpi xmlns:a14="http://schemas.microsoft.com/office/drawing/2010/main" val="0"/>
+              </a:ext>
+            </a:extLst>
+          </a:blip>
+          <a:srcRect/>
+          <a:stretch>
+            <a:fillRect/>
+          </a:stretch>
+        </p:blipFill>
+        <p:spPr bwMode="auto">
+          <a:xfrm>
+            <a:off x="5295900" y="2637239"/>
+            <a:ext cx="3124200" cy="3634180"/>
+          </a:xfrm>
+          <a:prstGeom prst="rect">
+            <a:avLst/>
+          </a:prstGeom>
+          <a:noFill/>
+          <a:extLst>
+            <a:ext uri="{909E8E84-426E-40DD-AFC4-6F175D3DCCD1}">
+              <a14:hiddenFill xmlns:a14="http://schemas.microsoft.com/office/drawing/2010/main">
+                <a:solidFill>
+                  <a:srgbClr val="FFFFFF"/>
+                </a:solidFill>
+              </a14:hiddenFill>
+            </a:ext>
+          </a:extLst>
+        </p:spPr>
+      </p:pic>
     </p:spTree>
     <p:extLst>
       <p:ext uri="{BB962C8B-B14F-4D97-AF65-F5344CB8AC3E}">
@@ -5647,7 +6464,7 @@
             </a:r>
             <a:r>
               <a:rPr lang="en-US" dirty="0"/>
-              <a:t> que Boeing</a:t>
+              <a:t> que Boeing?</a:t>
             </a:r>
           </a:p>
           <a:p>
@@ -5695,12 +6512,47 @@
               <a:rPr lang="en-US" dirty="0" err="1"/>
               <a:t>decolagem</a:t>
             </a:r>
+            <a:r>
+              <a:rPr lang="en-US" dirty="0"/>
+              <a:t>?</a:t>
+            </a:r>
+          </a:p>
+          <a:p>
+            <a:r>
+              <a:rPr lang="en-US" dirty="0" err="1"/>
+              <a:t>Fator</a:t>
+            </a:r>
+            <a:r>
+              <a:rPr lang="en-US" dirty="0"/>
+              <a:t> </a:t>
+            </a:r>
+            <a:r>
+              <a:rPr lang="en-US" dirty="0" err="1"/>
+              <a:t>contribuinte</a:t>
+            </a:r>
+            <a:r>
+              <a:rPr lang="en-US" dirty="0"/>
+              <a:t> para a </a:t>
+            </a:r>
+            <a:r>
+              <a:rPr lang="en-US" dirty="0" err="1"/>
+              <a:t>maioria</a:t>
+            </a:r>
+            <a:r>
+              <a:rPr lang="en-US" dirty="0"/>
+              <a:t> dos </a:t>
+            </a:r>
+            <a:r>
+              <a:rPr lang="en-US" dirty="0" err="1"/>
+              <a:t>incidentes</a:t>
+            </a:r>
             <a:endParaRPr lang="en-US" dirty="0"/>
           </a:p>
           <a:p>
-            <a:r>
-              <a:rPr lang="en-US" dirty="0" err="1"/>
-              <a:t>Fator</a:t>
+            <a:pPr lvl="1"/>
+            <a:r>
+              <a:rPr lang="en-US" dirty="0" err="1"/>
+              <a:t>Falha</a:t>
             </a:r>
             <a:r>
               <a:rPr lang="en-US" dirty="0"/>
@@ -5708,41 +6560,12 @@
             </a:r>
             <a:r>
               <a:rPr lang="en-US" dirty="0" err="1"/>
-              <a:t>contribuinte</a:t>
-            </a:r>
-            <a:r>
-              <a:rPr lang="en-US" dirty="0"/>
-              <a:t> para a </a:t>
-            </a:r>
-            <a:r>
-              <a:rPr lang="en-US" dirty="0" err="1"/>
-              <a:t>maioria</a:t>
-            </a:r>
-            <a:r>
-              <a:rPr lang="en-US" dirty="0"/>
-              <a:t> dos </a:t>
-            </a:r>
-            <a:r>
-              <a:rPr lang="en-US" dirty="0" err="1"/>
-              <a:t>incidentes</a:t>
-            </a:r>
-            <a:endParaRPr lang="en-US" dirty="0"/>
-          </a:p>
-          <a:p>
-            <a:pPr lvl="1"/>
-            <a:r>
-              <a:rPr lang="en-US" dirty="0" err="1"/>
-              <a:t>Falha</a:t>
-            </a:r>
-            <a:r>
-              <a:rPr lang="en-US" dirty="0"/>
-              <a:t> </a:t>
-            </a:r>
-            <a:r>
-              <a:rPr lang="en-US" dirty="0" err="1"/>
               <a:t>humana</a:t>
             </a:r>
-            <a:endParaRPr lang="en-US" dirty="0"/>
+            <a:r>
+              <a:rPr lang="en-US" dirty="0"/>
+              <a:t>?</a:t>
+            </a:r>
           </a:p>
           <a:p>
             <a:endParaRPr lang="en-US" dirty="0"/>
@@ -6037,12 +6860,8 @@
           <a:lstStyle/>
           <a:p>
             <a:r>
-              <a:rPr lang="en-US" dirty="0" err="1"/>
-              <a:t>Os</a:t>
-            </a:r>
-            <a:r>
-              <a:rPr lang="en-US" dirty="0"/>
-              <a:t> Datasets</a:t>
+              <a:rPr lang="en-US" dirty="0"/>
+              <a:t>O Dataset</a:t>
             </a:r>
           </a:p>
         </p:txBody>
@@ -6967,6 +7786,52 @@
           </a:graphicData>
         </a:graphic>
       </p:graphicFrame>
+      <p:sp>
+        <p:nvSpPr>
+          <p:cNvPr id="4" name="Elipse 3"/>
+          <p:cNvSpPr/>
+          <p:nvPr/>
+        </p:nvSpPr>
+        <p:spPr>
+          <a:xfrm>
+            <a:off x="914400" y="5105400"/>
+            <a:ext cx="7772400" cy="609600"/>
+          </a:xfrm>
+          <a:prstGeom prst="ellipse">
+            <a:avLst/>
+          </a:prstGeom>
+          <a:noFill/>
+          <a:ln>
+            <a:solidFill>
+              <a:srgbClr val="FF0000"/>
+            </a:solidFill>
+          </a:ln>
+        </p:spPr>
+        <p:style>
+          <a:lnRef idx="2">
+            <a:schemeClr val="accent1">
+              <a:shade val="50000"/>
+            </a:schemeClr>
+          </a:lnRef>
+          <a:fillRef idx="1">
+            <a:schemeClr val="accent1"/>
+          </a:fillRef>
+          <a:effectRef idx="0">
+            <a:schemeClr val="accent1"/>
+          </a:effectRef>
+          <a:fontRef idx="minor">
+            <a:schemeClr val="lt1"/>
+          </a:fontRef>
+        </p:style>
+        <p:txBody>
+          <a:bodyPr rtlCol="0" anchor="ctr"/>
+          <a:lstStyle/>
+          <a:p>
+            <a:pPr algn="ctr"/>
+            <a:endParaRPr lang="pt-BR"/>
+          </a:p>
+        </p:txBody>
+      </p:sp>
     </p:spTree>
     <p:extLst>
       <p:ext uri="{BB962C8B-B14F-4D97-AF65-F5344CB8AC3E}">

</xml_diff>